<commit_message>
[Article] SQL Server Isolation
</commit_message>
<xml_diff>
--- a/_devops/Presentations/FunkyCode Articles.pptx
+++ b/_devops/Presentations/FunkyCode Articles.pptx
@@ -6,6 +6,7 @@
   </p:sldMasterIdLst>
   <p:sldIdLst>
     <p:sldId id="256" r:id="rId2"/>
+    <p:sldId id="257" r:id="rId3"/>
   </p:sldIdLst>
   <p:sldSz cx="12192000" cy="6858000"/>
   <p:notesSz cx="6858000" cy="9144000"/>
@@ -104,6 +105,11 @@
       </a:defRPr>
     </a:lvl9pPr>
   </p:defaultTextStyle>
+  <p:extLst>
+    <p:ext uri="{EFAFB233-063F-42B5-8137-9DF3F51BA10A}">
+      <p15:sldGuideLst xmlns:p15="http://schemas.microsoft.com/office/powerpoint/2012/main"/>
+    </p:ext>
+  </p:extLst>
 </p:presentation>
 </file>
 
@@ -254,7 +260,7 @@
           <a:p>
             <a:fld id="{BBDD0A7E-F4FE-45A5-BBB4-0E5516FE760F}" type="datetimeFigureOut">
               <a:rPr lang="en-US" smtClean="0"/>
-              <a:t>7/23/2020</a:t>
+              <a:t>7/27/2020</a:t>
             </a:fld>
             <a:endParaRPr lang="en-US"/>
           </a:p>
@@ -452,7 +458,7 @@
           <a:p>
             <a:fld id="{BBDD0A7E-F4FE-45A5-BBB4-0E5516FE760F}" type="datetimeFigureOut">
               <a:rPr lang="en-US" smtClean="0"/>
-              <a:t>7/23/2020</a:t>
+              <a:t>7/27/2020</a:t>
             </a:fld>
             <a:endParaRPr lang="en-US"/>
           </a:p>
@@ -660,7 +666,7 @@
           <a:p>
             <a:fld id="{BBDD0A7E-F4FE-45A5-BBB4-0E5516FE760F}" type="datetimeFigureOut">
               <a:rPr lang="en-US" smtClean="0"/>
-              <a:t>7/23/2020</a:t>
+              <a:t>7/27/2020</a:t>
             </a:fld>
             <a:endParaRPr lang="en-US"/>
           </a:p>
@@ -858,7 +864,7 @@
           <a:p>
             <a:fld id="{BBDD0A7E-F4FE-45A5-BBB4-0E5516FE760F}" type="datetimeFigureOut">
               <a:rPr lang="en-US" smtClean="0"/>
-              <a:t>7/23/2020</a:t>
+              <a:t>7/27/2020</a:t>
             </a:fld>
             <a:endParaRPr lang="en-US"/>
           </a:p>
@@ -1133,7 +1139,7 @@
           <a:p>
             <a:fld id="{BBDD0A7E-F4FE-45A5-BBB4-0E5516FE760F}" type="datetimeFigureOut">
               <a:rPr lang="en-US" smtClean="0"/>
-              <a:t>7/23/2020</a:t>
+              <a:t>7/27/2020</a:t>
             </a:fld>
             <a:endParaRPr lang="en-US"/>
           </a:p>
@@ -1398,7 +1404,7 @@
           <a:p>
             <a:fld id="{BBDD0A7E-F4FE-45A5-BBB4-0E5516FE760F}" type="datetimeFigureOut">
               <a:rPr lang="en-US" smtClean="0"/>
-              <a:t>7/23/2020</a:t>
+              <a:t>7/27/2020</a:t>
             </a:fld>
             <a:endParaRPr lang="en-US"/>
           </a:p>
@@ -1810,7 +1816,7 @@
           <a:p>
             <a:fld id="{BBDD0A7E-F4FE-45A5-BBB4-0E5516FE760F}" type="datetimeFigureOut">
               <a:rPr lang="en-US" smtClean="0"/>
-              <a:t>7/23/2020</a:t>
+              <a:t>7/27/2020</a:t>
             </a:fld>
             <a:endParaRPr lang="en-US"/>
           </a:p>
@@ -1951,7 +1957,7 @@
           <a:p>
             <a:fld id="{BBDD0A7E-F4FE-45A5-BBB4-0E5516FE760F}" type="datetimeFigureOut">
               <a:rPr lang="en-US" smtClean="0"/>
-              <a:t>7/23/2020</a:t>
+              <a:t>7/27/2020</a:t>
             </a:fld>
             <a:endParaRPr lang="en-US"/>
           </a:p>
@@ -2064,7 +2070,7 @@
           <a:p>
             <a:fld id="{BBDD0A7E-F4FE-45A5-BBB4-0E5516FE760F}" type="datetimeFigureOut">
               <a:rPr lang="en-US" smtClean="0"/>
-              <a:t>7/23/2020</a:t>
+              <a:t>7/27/2020</a:t>
             </a:fld>
             <a:endParaRPr lang="en-US"/>
           </a:p>
@@ -2375,7 +2381,7 @@
           <a:p>
             <a:fld id="{BBDD0A7E-F4FE-45A5-BBB4-0E5516FE760F}" type="datetimeFigureOut">
               <a:rPr lang="en-US" smtClean="0"/>
-              <a:t>7/23/2020</a:t>
+              <a:t>7/27/2020</a:t>
             </a:fld>
             <a:endParaRPr lang="en-US"/>
           </a:p>
@@ -2663,7 +2669,7 @@
           <a:p>
             <a:fld id="{BBDD0A7E-F4FE-45A5-BBB4-0E5516FE760F}" type="datetimeFigureOut">
               <a:rPr lang="en-US" smtClean="0"/>
-              <a:t>7/23/2020</a:t>
+              <a:t>7/27/2020</a:t>
             </a:fld>
             <a:endParaRPr lang="en-US"/>
           </a:p>
@@ -2904,7 +2910,7 @@
           <a:p>
             <a:fld id="{BBDD0A7E-F4FE-45A5-BBB4-0E5516FE760F}" type="datetimeFigureOut">
               <a:rPr lang="en-US" smtClean="0"/>
-              <a:t>7/23/2020</a:t>
+              <a:t>7/27/2020</a:t>
             </a:fld>
             <a:endParaRPr lang="en-US"/>
           </a:p>
@@ -3695,6 +3701,773 @@
 </p:sld>
 </file>
 
+<file path=ppt/slides/slide2.xml><?xml version="1.0" encoding="utf-8"?>
+<p:sld xmlns:a="http://schemas.openxmlformats.org/drawingml/2006/main" xmlns:r="http://schemas.openxmlformats.org/officeDocument/2006/relationships" xmlns:p="http://schemas.openxmlformats.org/presentationml/2006/main">
+  <p:cSld>
+    <p:spTree>
+      <p:nvGrpSpPr>
+        <p:cNvPr id="1" name=""/>
+        <p:cNvGrpSpPr/>
+        <p:nvPr/>
+      </p:nvGrpSpPr>
+      <p:grpSpPr>
+        <a:xfrm>
+          <a:off x="0" y="0"/>
+          <a:ext cx="0" cy="0"/>
+          <a:chOff x="0" y="0"/>
+          <a:chExt cx="0" cy="0"/>
+        </a:xfrm>
+      </p:grpSpPr>
+      <p:sp>
+        <p:nvSpPr>
+          <p:cNvPr id="4" name="TextBox 3">
+            <a:extLst>
+              <a:ext uri="{FF2B5EF4-FFF2-40B4-BE49-F238E27FC236}">
+                <a16:creationId xmlns:a16="http://schemas.microsoft.com/office/drawing/2014/main" id="{F722EEDA-1F35-4DEA-9497-D1F41A650142}"/>
+              </a:ext>
+            </a:extLst>
+          </p:cNvPr>
+          <p:cNvSpPr txBox="1"/>
+          <p:nvPr/>
+        </p:nvSpPr>
+        <p:spPr>
+          <a:xfrm>
+            <a:off x="2075932" y="2667097"/>
+            <a:ext cx="1488361" cy="646331"/>
+          </a:xfrm>
+          <a:prstGeom prst="rect">
+            <a:avLst/>
+          </a:prstGeom>
+          <a:solidFill>
+            <a:schemeClr val="accent1"/>
+          </a:solidFill>
+        </p:spPr>
+        <p:txBody>
+          <a:bodyPr wrap="square" rtlCol="0" anchor="ctr">
+            <a:noAutofit/>
+          </a:bodyPr>
+          <a:lstStyle/>
+          <a:p>
+            <a:pPr algn="ctr"/>
+            <a:r>
+              <a:rPr lang="pl-PL" dirty="0">
+                <a:solidFill>
+                  <a:schemeClr val="bg1"/>
+                </a:solidFill>
+              </a:rPr>
+              <a:t>Dirty reads</a:t>
+            </a:r>
+            <a:endParaRPr lang="en-US" dirty="0">
+              <a:solidFill>
+                <a:schemeClr val="bg1"/>
+              </a:solidFill>
+            </a:endParaRPr>
+          </a:p>
+        </p:txBody>
+      </p:sp>
+      <p:sp>
+        <p:nvSpPr>
+          <p:cNvPr id="5" name="TextBox 4">
+            <a:extLst>
+              <a:ext uri="{FF2B5EF4-FFF2-40B4-BE49-F238E27FC236}">
+                <a16:creationId xmlns:a16="http://schemas.microsoft.com/office/drawing/2014/main" id="{B261CFD0-06F5-4D77-A9B8-01E1A02F0604}"/>
+              </a:ext>
+            </a:extLst>
+          </p:cNvPr>
+          <p:cNvSpPr txBox="1"/>
+          <p:nvPr/>
+        </p:nvSpPr>
+        <p:spPr>
+          <a:xfrm>
+            <a:off x="2075932" y="3492517"/>
+            <a:ext cx="1488361" cy="646331"/>
+          </a:xfrm>
+          <a:prstGeom prst="rect">
+            <a:avLst/>
+          </a:prstGeom>
+          <a:solidFill>
+            <a:schemeClr val="accent6">
+              <a:lumMod val="75000"/>
+            </a:schemeClr>
+          </a:solidFill>
+        </p:spPr>
+        <p:txBody>
+          <a:bodyPr wrap="square" rtlCol="0" anchor="ctr">
+            <a:noAutofit/>
+          </a:bodyPr>
+          <a:lstStyle/>
+          <a:p>
+            <a:pPr algn="ctr"/>
+            <a:r>
+              <a:rPr lang="pl-PL" dirty="0">
+                <a:solidFill>
+                  <a:schemeClr val="bg1"/>
+                </a:solidFill>
+              </a:rPr>
+              <a:t>Repeatable reads</a:t>
+            </a:r>
+            <a:endParaRPr lang="en-US" dirty="0">
+              <a:solidFill>
+                <a:schemeClr val="bg1"/>
+              </a:solidFill>
+            </a:endParaRPr>
+          </a:p>
+        </p:txBody>
+      </p:sp>
+      <p:sp>
+        <p:nvSpPr>
+          <p:cNvPr id="6" name="TextBox 5">
+            <a:extLst>
+              <a:ext uri="{FF2B5EF4-FFF2-40B4-BE49-F238E27FC236}">
+                <a16:creationId xmlns:a16="http://schemas.microsoft.com/office/drawing/2014/main" id="{E15BA702-BEB3-48B9-AB10-9F5C3E6D6169}"/>
+              </a:ext>
+            </a:extLst>
+          </p:cNvPr>
+          <p:cNvSpPr txBox="1"/>
+          <p:nvPr/>
+        </p:nvSpPr>
+        <p:spPr>
+          <a:xfrm>
+            <a:off x="6750568" y="875981"/>
+            <a:ext cx="1488361" cy="646331"/>
+          </a:xfrm>
+          <a:prstGeom prst="rect">
+            <a:avLst/>
+          </a:prstGeom>
+          <a:solidFill>
+            <a:srgbClr val="7030A0"/>
+          </a:solidFill>
+        </p:spPr>
+        <p:txBody>
+          <a:bodyPr wrap="square" rtlCol="0" anchor="ctr">
+            <a:noAutofit/>
+          </a:bodyPr>
+          <a:lstStyle/>
+          <a:p>
+            <a:pPr algn="ctr"/>
+            <a:r>
+              <a:rPr lang="pl-PL" dirty="0">
+                <a:solidFill>
+                  <a:schemeClr val="bg1"/>
+                </a:solidFill>
+              </a:rPr>
+              <a:t>Phantoms</a:t>
+            </a:r>
+            <a:endParaRPr lang="en-US" dirty="0">
+              <a:solidFill>
+                <a:schemeClr val="bg1"/>
+              </a:solidFill>
+            </a:endParaRPr>
+          </a:p>
+        </p:txBody>
+      </p:sp>
+      <p:cxnSp>
+        <p:nvCxnSpPr>
+          <p:cNvPr id="9" name="Straight Connector 8">
+            <a:extLst>
+              <a:ext uri="{FF2B5EF4-FFF2-40B4-BE49-F238E27FC236}">
+                <a16:creationId xmlns:a16="http://schemas.microsoft.com/office/drawing/2014/main" id="{C91C1742-FFF7-4386-9A05-45DB22882633}"/>
+              </a:ext>
+            </a:extLst>
+          </p:cNvPr>
+          <p:cNvCxnSpPr>
+            <a:cxnSpLocks/>
+          </p:cNvCxnSpPr>
+          <p:nvPr/>
+        </p:nvCxnSpPr>
+        <p:spPr>
+          <a:xfrm flipH="1">
+            <a:off x="1662512" y="5159829"/>
+            <a:ext cx="9300957" cy="0"/>
+          </a:xfrm>
+          <a:prstGeom prst="line">
+            <a:avLst/>
+          </a:prstGeom>
+          <a:ln w="25400">
+            <a:headEnd type="triangle"/>
+          </a:ln>
+        </p:spPr>
+        <p:style>
+          <a:lnRef idx="1">
+            <a:schemeClr val="accent1"/>
+          </a:lnRef>
+          <a:fillRef idx="0">
+            <a:schemeClr val="accent1"/>
+          </a:fillRef>
+          <a:effectRef idx="0">
+            <a:schemeClr val="accent1"/>
+          </a:effectRef>
+          <a:fontRef idx="minor">
+            <a:schemeClr val="tx1"/>
+          </a:fontRef>
+        </p:style>
+      </p:cxnSp>
+      <p:sp>
+        <p:nvSpPr>
+          <p:cNvPr id="11" name="TextBox 10">
+            <a:extLst>
+              <a:ext uri="{FF2B5EF4-FFF2-40B4-BE49-F238E27FC236}">
+                <a16:creationId xmlns:a16="http://schemas.microsoft.com/office/drawing/2014/main" id="{C73FF1F7-540B-4442-8B3F-A5B6A83593E5}"/>
+              </a:ext>
+            </a:extLst>
+          </p:cNvPr>
+          <p:cNvSpPr txBox="1"/>
+          <p:nvPr/>
+        </p:nvSpPr>
+        <p:spPr>
+          <a:xfrm>
+            <a:off x="2075932" y="4322055"/>
+            <a:ext cx="1488361" cy="646331"/>
+          </a:xfrm>
+          <a:prstGeom prst="rect">
+            <a:avLst/>
+          </a:prstGeom>
+          <a:solidFill>
+            <a:srgbClr val="7030A0"/>
+          </a:solidFill>
+        </p:spPr>
+        <p:txBody>
+          <a:bodyPr wrap="square" rtlCol="0" anchor="ctr">
+            <a:noAutofit/>
+          </a:bodyPr>
+          <a:lstStyle/>
+          <a:p>
+            <a:pPr algn="ctr"/>
+            <a:r>
+              <a:rPr lang="pl-PL" dirty="0">
+                <a:solidFill>
+                  <a:schemeClr val="bg1"/>
+                </a:solidFill>
+              </a:rPr>
+              <a:t>Phantoms</a:t>
+            </a:r>
+            <a:endParaRPr lang="en-US" dirty="0">
+              <a:solidFill>
+                <a:schemeClr val="bg1"/>
+              </a:solidFill>
+            </a:endParaRPr>
+          </a:p>
+        </p:txBody>
+      </p:sp>
+      <p:sp>
+        <p:nvSpPr>
+          <p:cNvPr id="13" name="TextBox 12">
+            <a:extLst>
+              <a:ext uri="{FF2B5EF4-FFF2-40B4-BE49-F238E27FC236}">
+                <a16:creationId xmlns:a16="http://schemas.microsoft.com/office/drawing/2014/main" id="{70D07974-E635-4C70-AE1F-AB68619F39B0}"/>
+              </a:ext>
+            </a:extLst>
+          </p:cNvPr>
+          <p:cNvSpPr txBox="1"/>
+          <p:nvPr/>
+        </p:nvSpPr>
+        <p:spPr>
+          <a:xfrm>
+            <a:off x="4875116" y="875982"/>
+            <a:ext cx="1488361" cy="646331"/>
+          </a:xfrm>
+          <a:prstGeom prst="rect">
+            <a:avLst/>
+          </a:prstGeom>
+          <a:solidFill>
+            <a:schemeClr val="accent6">
+              <a:lumMod val="75000"/>
+            </a:schemeClr>
+          </a:solidFill>
+        </p:spPr>
+        <p:txBody>
+          <a:bodyPr wrap="square" rtlCol="0" anchor="ctr">
+            <a:noAutofit/>
+          </a:bodyPr>
+          <a:lstStyle/>
+          <a:p>
+            <a:pPr algn="ctr"/>
+            <a:r>
+              <a:rPr lang="pl-PL" dirty="0">
+                <a:solidFill>
+                  <a:schemeClr val="bg1"/>
+                </a:solidFill>
+              </a:rPr>
+              <a:t>Repeatable reads</a:t>
+            </a:r>
+            <a:endParaRPr lang="en-US" dirty="0">
+              <a:solidFill>
+                <a:schemeClr val="bg1"/>
+              </a:solidFill>
+            </a:endParaRPr>
+          </a:p>
+        </p:txBody>
+      </p:sp>
+      <p:sp>
+        <p:nvSpPr>
+          <p:cNvPr id="14" name="TextBox 13">
+            <a:extLst>
+              <a:ext uri="{FF2B5EF4-FFF2-40B4-BE49-F238E27FC236}">
+                <a16:creationId xmlns:a16="http://schemas.microsoft.com/office/drawing/2014/main" id="{7364AED5-AEDD-41FD-9F81-DBBD285ECA3C}"/>
+              </a:ext>
+            </a:extLst>
+          </p:cNvPr>
+          <p:cNvSpPr txBox="1"/>
+          <p:nvPr/>
+        </p:nvSpPr>
+        <p:spPr>
+          <a:xfrm>
+            <a:off x="4506688" y="4316816"/>
+            <a:ext cx="1488361" cy="646331"/>
+          </a:xfrm>
+          <a:prstGeom prst="rect">
+            <a:avLst/>
+          </a:prstGeom>
+          <a:solidFill>
+            <a:srgbClr val="7030A0"/>
+          </a:solidFill>
+        </p:spPr>
+        <p:txBody>
+          <a:bodyPr wrap="square" rtlCol="0" anchor="ctr">
+            <a:noAutofit/>
+          </a:bodyPr>
+          <a:lstStyle/>
+          <a:p>
+            <a:pPr algn="ctr"/>
+            <a:r>
+              <a:rPr lang="pl-PL" dirty="0">
+                <a:solidFill>
+                  <a:schemeClr val="bg1"/>
+                </a:solidFill>
+              </a:rPr>
+              <a:t>Phantoms</a:t>
+            </a:r>
+            <a:endParaRPr lang="en-US" dirty="0">
+              <a:solidFill>
+                <a:schemeClr val="bg1"/>
+              </a:solidFill>
+            </a:endParaRPr>
+          </a:p>
+        </p:txBody>
+      </p:sp>
+      <p:sp>
+        <p:nvSpPr>
+          <p:cNvPr id="16" name="TextBox 15">
+            <a:extLst>
+              <a:ext uri="{FF2B5EF4-FFF2-40B4-BE49-F238E27FC236}">
+                <a16:creationId xmlns:a16="http://schemas.microsoft.com/office/drawing/2014/main" id="{1F9C04FC-7F72-418F-AE42-6F53146D71C3}"/>
+              </a:ext>
+            </a:extLst>
+          </p:cNvPr>
+          <p:cNvSpPr txBox="1"/>
+          <p:nvPr/>
+        </p:nvSpPr>
+        <p:spPr>
+          <a:xfrm>
+            <a:off x="7002496" y="4258538"/>
+            <a:ext cx="1488361" cy="646331"/>
+          </a:xfrm>
+          <a:prstGeom prst="rect">
+            <a:avLst/>
+          </a:prstGeom>
+          <a:solidFill>
+            <a:srgbClr val="7030A0"/>
+          </a:solidFill>
+        </p:spPr>
+        <p:txBody>
+          <a:bodyPr wrap="square" rtlCol="0" anchor="ctr">
+            <a:noAutofit/>
+          </a:bodyPr>
+          <a:lstStyle/>
+          <a:p>
+            <a:pPr algn="ctr"/>
+            <a:r>
+              <a:rPr lang="pl-PL" dirty="0">
+                <a:solidFill>
+                  <a:schemeClr val="bg1"/>
+                </a:solidFill>
+              </a:rPr>
+              <a:t>Phantoms</a:t>
+            </a:r>
+            <a:endParaRPr lang="en-US" dirty="0">
+              <a:solidFill>
+                <a:schemeClr val="bg1"/>
+              </a:solidFill>
+            </a:endParaRPr>
+          </a:p>
+        </p:txBody>
+      </p:sp>
+      <p:cxnSp>
+        <p:nvCxnSpPr>
+          <p:cNvPr id="18" name="Straight Connector 17">
+            <a:extLst>
+              <a:ext uri="{FF2B5EF4-FFF2-40B4-BE49-F238E27FC236}">
+                <a16:creationId xmlns:a16="http://schemas.microsoft.com/office/drawing/2014/main" id="{CFDA6155-2FA1-4740-8442-B2DF1C03A3C1}"/>
+              </a:ext>
+            </a:extLst>
+          </p:cNvPr>
+          <p:cNvCxnSpPr>
+            <a:cxnSpLocks/>
+          </p:cNvCxnSpPr>
+          <p:nvPr/>
+        </p:nvCxnSpPr>
+        <p:spPr>
+          <a:xfrm>
+            <a:off x="4035490" y="4813041"/>
+            <a:ext cx="0" cy="693576"/>
+          </a:xfrm>
+          <a:prstGeom prst="line">
+            <a:avLst/>
+          </a:prstGeom>
+          <a:ln w="25400">
+            <a:headEnd type="none"/>
+          </a:ln>
+        </p:spPr>
+        <p:style>
+          <a:lnRef idx="1">
+            <a:schemeClr val="accent1"/>
+          </a:lnRef>
+          <a:fillRef idx="0">
+            <a:schemeClr val="accent1"/>
+          </a:fillRef>
+          <a:effectRef idx="0">
+            <a:schemeClr val="accent1"/>
+          </a:effectRef>
+          <a:fontRef idx="minor">
+            <a:schemeClr val="tx1"/>
+          </a:fontRef>
+        </p:style>
+      </p:cxnSp>
+      <p:cxnSp>
+        <p:nvCxnSpPr>
+          <p:cNvPr id="20" name="Straight Connector 19">
+            <a:extLst>
+              <a:ext uri="{FF2B5EF4-FFF2-40B4-BE49-F238E27FC236}">
+                <a16:creationId xmlns:a16="http://schemas.microsoft.com/office/drawing/2014/main" id="{E8EF4CC8-CFD2-4EBA-A300-7449BACB08C5}"/>
+              </a:ext>
+            </a:extLst>
+          </p:cNvPr>
+          <p:cNvCxnSpPr>
+            <a:cxnSpLocks/>
+          </p:cNvCxnSpPr>
+          <p:nvPr/>
+        </p:nvCxnSpPr>
+        <p:spPr>
+          <a:xfrm>
+            <a:off x="6567196" y="4813041"/>
+            <a:ext cx="0" cy="693576"/>
+          </a:xfrm>
+          <a:prstGeom prst="line">
+            <a:avLst/>
+          </a:prstGeom>
+          <a:ln w="25400">
+            <a:headEnd type="none"/>
+          </a:ln>
+        </p:spPr>
+        <p:style>
+          <a:lnRef idx="1">
+            <a:schemeClr val="accent1"/>
+          </a:lnRef>
+          <a:fillRef idx="0">
+            <a:schemeClr val="accent1"/>
+          </a:fillRef>
+          <a:effectRef idx="0">
+            <a:schemeClr val="accent1"/>
+          </a:effectRef>
+          <a:fontRef idx="minor">
+            <a:schemeClr val="tx1"/>
+          </a:fontRef>
+        </p:style>
+      </p:cxnSp>
+      <p:cxnSp>
+        <p:nvCxnSpPr>
+          <p:cNvPr id="21" name="Straight Connector 20">
+            <a:extLst>
+              <a:ext uri="{FF2B5EF4-FFF2-40B4-BE49-F238E27FC236}">
+                <a16:creationId xmlns:a16="http://schemas.microsoft.com/office/drawing/2014/main" id="{A2842D40-507A-4E47-B394-CB3E76680D42}"/>
+              </a:ext>
+            </a:extLst>
+          </p:cNvPr>
+          <p:cNvCxnSpPr>
+            <a:cxnSpLocks/>
+          </p:cNvCxnSpPr>
+          <p:nvPr/>
+        </p:nvCxnSpPr>
+        <p:spPr>
+          <a:xfrm>
+            <a:off x="8893629" y="4766465"/>
+            <a:ext cx="0" cy="693576"/>
+          </a:xfrm>
+          <a:prstGeom prst="line">
+            <a:avLst/>
+          </a:prstGeom>
+          <a:ln w="25400">
+            <a:headEnd type="none"/>
+          </a:ln>
+        </p:spPr>
+        <p:style>
+          <a:lnRef idx="1">
+            <a:schemeClr val="accent1"/>
+          </a:lnRef>
+          <a:fillRef idx="0">
+            <a:schemeClr val="accent1"/>
+          </a:fillRef>
+          <a:effectRef idx="0">
+            <a:schemeClr val="accent1"/>
+          </a:effectRef>
+          <a:fontRef idx="minor">
+            <a:schemeClr val="tx1"/>
+          </a:fontRef>
+        </p:style>
+      </p:cxnSp>
+      <p:sp>
+        <p:nvSpPr>
+          <p:cNvPr id="23" name="TextBox 22">
+            <a:extLst>
+              <a:ext uri="{FF2B5EF4-FFF2-40B4-BE49-F238E27FC236}">
+                <a16:creationId xmlns:a16="http://schemas.microsoft.com/office/drawing/2014/main" id="{6EF44476-A098-45FF-B19D-7787DB9E62D1}"/>
+              </a:ext>
+            </a:extLst>
+          </p:cNvPr>
+          <p:cNvSpPr txBox="1"/>
+          <p:nvPr/>
+        </p:nvSpPr>
+        <p:spPr>
+          <a:xfrm>
+            <a:off x="2981002" y="875983"/>
+            <a:ext cx="1488361" cy="646331"/>
+          </a:xfrm>
+          <a:prstGeom prst="rect">
+            <a:avLst/>
+          </a:prstGeom>
+          <a:solidFill>
+            <a:schemeClr val="accent1"/>
+          </a:solidFill>
+        </p:spPr>
+        <p:txBody>
+          <a:bodyPr wrap="square" rtlCol="0" anchor="ctr">
+            <a:noAutofit/>
+          </a:bodyPr>
+          <a:lstStyle/>
+          <a:p>
+            <a:pPr algn="ctr"/>
+            <a:r>
+              <a:rPr lang="pl-PL" dirty="0">
+                <a:solidFill>
+                  <a:schemeClr val="bg1"/>
+                </a:solidFill>
+              </a:rPr>
+              <a:t>Dirty reads</a:t>
+            </a:r>
+            <a:endParaRPr lang="en-US" dirty="0">
+              <a:solidFill>
+                <a:schemeClr val="bg1"/>
+              </a:solidFill>
+            </a:endParaRPr>
+          </a:p>
+        </p:txBody>
+      </p:sp>
+      <p:sp>
+        <p:nvSpPr>
+          <p:cNvPr id="24" name="TextBox 23">
+            <a:extLst>
+              <a:ext uri="{FF2B5EF4-FFF2-40B4-BE49-F238E27FC236}">
+                <a16:creationId xmlns:a16="http://schemas.microsoft.com/office/drawing/2014/main" id="{B49DA763-11CB-45F2-8862-872BE87C152B}"/>
+              </a:ext>
+            </a:extLst>
+          </p:cNvPr>
+          <p:cNvSpPr txBox="1"/>
+          <p:nvPr/>
+        </p:nvSpPr>
+        <p:spPr>
+          <a:xfrm>
+            <a:off x="1662512" y="5321951"/>
+            <a:ext cx="2137380" cy="369332"/>
+          </a:xfrm>
+          <a:prstGeom prst="rect">
+            <a:avLst/>
+          </a:prstGeom>
+          <a:noFill/>
+        </p:spPr>
+        <p:txBody>
+          <a:bodyPr wrap="none" rtlCol="0">
+            <a:spAutoFit/>
+          </a:bodyPr>
+          <a:lstStyle/>
+          <a:p>
+            <a:r>
+              <a:rPr lang="pl-PL" dirty="0"/>
+              <a:t>READ UNCOMMITED</a:t>
+            </a:r>
+            <a:endParaRPr lang="en-US" dirty="0"/>
+          </a:p>
+        </p:txBody>
+      </p:sp>
+      <p:sp>
+        <p:nvSpPr>
+          <p:cNvPr id="25" name="TextBox 24">
+            <a:extLst>
+              <a:ext uri="{FF2B5EF4-FFF2-40B4-BE49-F238E27FC236}">
+                <a16:creationId xmlns:a16="http://schemas.microsoft.com/office/drawing/2014/main" id="{A1BDCEE1-9E61-4B5B-BDEE-7B4378B5BF08}"/>
+              </a:ext>
+            </a:extLst>
+          </p:cNvPr>
+          <p:cNvSpPr txBox="1"/>
+          <p:nvPr/>
+        </p:nvSpPr>
+        <p:spPr>
+          <a:xfrm>
+            <a:off x="4335733" y="5298146"/>
+            <a:ext cx="1840825" cy="369332"/>
+          </a:xfrm>
+          <a:prstGeom prst="rect">
+            <a:avLst/>
+          </a:prstGeom>
+          <a:noFill/>
+        </p:spPr>
+        <p:txBody>
+          <a:bodyPr wrap="none" rtlCol="0">
+            <a:spAutoFit/>
+          </a:bodyPr>
+          <a:lstStyle/>
+          <a:p>
+            <a:r>
+              <a:rPr lang="pl-PL" dirty="0"/>
+              <a:t>READ COMMITED</a:t>
+            </a:r>
+            <a:endParaRPr lang="en-US" dirty="0"/>
+          </a:p>
+        </p:txBody>
+      </p:sp>
+      <p:sp>
+        <p:nvSpPr>
+          <p:cNvPr id="26" name="TextBox 25">
+            <a:extLst>
+              <a:ext uri="{FF2B5EF4-FFF2-40B4-BE49-F238E27FC236}">
+                <a16:creationId xmlns:a16="http://schemas.microsoft.com/office/drawing/2014/main" id="{7C4A4776-5B65-4B2C-A7FE-4325ED66C6D5}"/>
+              </a:ext>
+            </a:extLst>
+          </p:cNvPr>
+          <p:cNvSpPr txBox="1"/>
+          <p:nvPr/>
+        </p:nvSpPr>
+        <p:spPr>
+          <a:xfrm>
+            <a:off x="6810000" y="5298146"/>
+            <a:ext cx="1996700" cy="369332"/>
+          </a:xfrm>
+          <a:prstGeom prst="rect">
+            <a:avLst/>
+          </a:prstGeom>
+          <a:noFill/>
+        </p:spPr>
+        <p:txBody>
+          <a:bodyPr wrap="none" rtlCol="0">
+            <a:spAutoFit/>
+          </a:bodyPr>
+          <a:lstStyle/>
+          <a:p>
+            <a:r>
+              <a:rPr lang="pl-PL" dirty="0"/>
+              <a:t>REPEATABLE READS</a:t>
+            </a:r>
+            <a:endParaRPr lang="en-US" dirty="0"/>
+          </a:p>
+        </p:txBody>
+      </p:sp>
+      <p:sp>
+        <p:nvSpPr>
+          <p:cNvPr id="28" name="TextBox 27">
+            <a:extLst>
+              <a:ext uri="{FF2B5EF4-FFF2-40B4-BE49-F238E27FC236}">
+                <a16:creationId xmlns:a16="http://schemas.microsoft.com/office/drawing/2014/main" id="{184E2DB2-30F8-430B-9D4D-376D23EF63F6}"/>
+              </a:ext>
+            </a:extLst>
+          </p:cNvPr>
+          <p:cNvSpPr txBox="1"/>
+          <p:nvPr/>
+        </p:nvSpPr>
+        <p:spPr>
+          <a:xfrm>
+            <a:off x="4506688" y="3492516"/>
+            <a:ext cx="1488361" cy="646331"/>
+          </a:xfrm>
+          <a:prstGeom prst="rect">
+            <a:avLst/>
+          </a:prstGeom>
+          <a:solidFill>
+            <a:schemeClr val="accent6">
+              <a:lumMod val="75000"/>
+            </a:schemeClr>
+          </a:solidFill>
+        </p:spPr>
+        <p:txBody>
+          <a:bodyPr wrap="square" rtlCol="0" anchor="ctr">
+            <a:noAutofit/>
+          </a:bodyPr>
+          <a:lstStyle/>
+          <a:p>
+            <a:pPr algn="ctr"/>
+            <a:r>
+              <a:rPr lang="pl-PL" dirty="0">
+                <a:solidFill>
+                  <a:schemeClr val="bg1"/>
+                </a:solidFill>
+              </a:rPr>
+              <a:t>Repeatable reads</a:t>
+            </a:r>
+            <a:endParaRPr lang="en-US" dirty="0">
+              <a:solidFill>
+                <a:schemeClr val="bg1"/>
+              </a:solidFill>
+            </a:endParaRPr>
+          </a:p>
+        </p:txBody>
+      </p:sp>
+      <p:sp>
+        <p:nvSpPr>
+          <p:cNvPr id="29" name="TextBox 28">
+            <a:extLst>
+              <a:ext uri="{FF2B5EF4-FFF2-40B4-BE49-F238E27FC236}">
+                <a16:creationId xmlns:a16="http://schemas.microsoft.com/office/drawing/2014/main" id="{A0D9699F-3BD6-4E47-8122-754B849E7153}"/>
+              </a:ext>
+            </a:extLst>
+          </p:cNvPr>
+          <p:cNvSpPr txBox="1"/>
+          <p:nvPr/>
+        </p:nvSpPr>
+        <p:spPr>
+          <a:xfrm>
+            <a:off x="9296402" y="5298146"/>
+            <a:ext cx="1448217" cy="369332"/>
+          </a:xfrm>
+          <a:prstGeom prst="rect">
+            <a:avLst/>
+          </a:prstGeom>
+          <a:noFill/>
+        </p:spPr>
+        <p:txBody>
+          <a:bodyPr wrap="none" rtlCol="0">
+            <a:spAutoFit/>
+          </a:bodyPr>
+          <a:lstStyle/>
+          <a:p>
+            <a:r>
+              <a:rPr lang="pl-PL" dirty="0"/>
+              <a:t>SERIALIZABLE</a:t>
+            </a:r>
+            <a:endParaRPr lang="en-US" dirty="0"/>
+          </a:p>
+        </p:txBody>
+      </p:sp>
+    </p:spTree>
+    <p:extLst>
+      <p:ext uri="{BB962C8B-B14F-4D97-AF65-F5344CB8AC3E}">
+        <p14:creationId xmlns:p14="http://schemas.microsoft.com/office/powerpoint/2010/main" val="2188302669"/>
+      </p:ext>
+    </p:extLst>
+  </p:cSld>
+  <p:clrMapOvr>
+    <a:masterClrMapping/>
+  </p:clrMapOvr>
+</p:sld>
+</file>
+
 <file path=ppt/theme/theme1.xml><?xml version="1.0" encoding="utf-8"?>
 <a:theme xmlns:a="http://schemas.openxmlformats.org/drawingml/2006/main" name="Office Theme">
   <a:themeElements>

</xml_diff>